<commit_message>
The New Revival! :O ZOMBIEEEE! RUUN TO THE HILLS!
</commit_message>
<xml_diff>
--- a/Game/Game/Presentation1.pptx
+++ b/Game/Game/Presentation1.pptx
@@ -289,7 +289,7 @@
             <a:fld id="{594F42AE-C09B-49E1-9668-264D417E4CAA}" type="datetimeFigureOut">
               <a:rPr lang="en-US" smtClean="0"/>
               <a:pPr/>
-              <a:t>2/4/2013</a:t>
+              <a:t>2/5/2013</a:t>
             </a:fld>
             <a:endParaRPr lang="en-US"/>
           </a:p>
@@ -456,7 +456,7 @@
             <a:fld id="{594F42AE-C09B-49E1-9668-264D417E4CAA}" type="datetimeFigureOut">
               <a:rPr lang="en-US" smtClean="0"/>
               <a:pPr/>
-              <a:t>2/4/2013</a:t>
+              <a:t>2/5/2013</a:t>
             </a:fld>
             <a:endParaRPr lang="en-US"/>
           </a:p>
@@ -633,7 +633,7 @@
             <a:fld id="{594F42AE-C09B-49E1-9668-264D417E4CAA}" type="datetimeFigureOut">
               <a:rPr lang="en-US" smtClean="0"/>
               <a:pPr/>
-              <a:t>2/4/2013</a:t>
+              <a:t>2/5/2013</a:t>
             </a:fld>
             <a:endParaRPr lang="en-US"/>
           </a:p>
@@ -800,7 +800,7 @@
             <a:fld id="{594F42AE-C09B-49E1-9668-264D417E4CAA}" type="datetimeFigureOut">
               <a:rPr lang="en-US" smtClean="0"/>
               <a:pPr/>
-              <a:t>2/4/2013</a:t>
+              <a:t>2/5/2013</a:t>
             </a:fld>
             <a:endParaRPr lang="en-US"/>
           </a:p>
@@ -1043,7 +1043,7 @@
             <a:fld id="{594F42AE-C09B-49E1-9668-264D417E4CAA}" type="datetimeFigureOut">
               <a:rPr lang="en-US" smtClean="0"/>
               <a:pPr/>
-              <a:t>2/4/2013</a:t>
+              <a:t>2/5/2013</a:t>
             </a:fld>
             <a:endParaRPr lang="en-US"/>
           </a:p>
@@ -1328,7 +1328,7 @@
             <a:fld id="{594F42AE-C09B-49E1-9668-264D417E4CAA}" type="datetimeFigureOut">
               <a:rPr lang="en-US" smtClean="0"/>
               <a:pPr/>
-              <a:t>2/4/2013</a:t>
+              <a:t>2/5/2013</a:t>
             </a:fld>
             <a:endParaRPr lang="en-US"/>
           </a:p>
@@ -1747,7 +1747,7 @@
             <a:fld id="{594F42AE-C09B-49E1-9668-264D417E4CAA}" type="datetimeFigureOut">
               <a:rPr lang="en-US" smtClean="0"/>
               <a:pPr/>
-              <a:t>2/4/2013</a:t>
+              <a:t>2/5/2013</a:t>
             </a:fld>
             <a:endParaRPr lang="en-US"/>
           </a:p>
@@ -1862,7 +1862,7 @@
             <a:fld id="{594F42AE-C09B-49E1-9668-264D417E4CAA}" type="datetimeFigureOut">
               <a:rPr lang="en-US" smtClean="0"/>
               <a:pPr/>
-              <a:t>2/4/2013</a:t>
+              <a:t>2/5/2013</a:t>
             </a:fld>
             <a:endParaRPr lang="en-US"/>
           </a:p>
@@ -1954,7 +1954,7 @@
             <a:fld id="{594F42AE-C09B-49E1-9668-264D417E4CAA}" type="datetimeFigureOut">
               <a:rPr lang="en-US" smtClean="0"/>
               <a:pPr/>
-              <a:t>2/4/2013</a:t>
+              <a:t>2/5/2013</a:t>
             </a:fld>
             <a:endParaRPr lang="en-US"/>
           </a:p>
@@ -2228,7 +2228,7 @@
             <a:fld id="{594F42AE-C09B-49E1-9668-264D417E4CAA}" type="datetimeFigureOut">
               <a:rPr lang="en-US" smtClean="0"/>
               <a:pPr/>
-              <a:t>2/4/2013</a:t>
+              <a:t>2/5/2013</a:t>
             </a:fld>
             <a:endParaRPr lang="en-US"/>
           </a:p>
@@ -2478,7 +2478,7 @@
             <a:fld id="{594F42AE-C09B-49E1-9668-264D417E4CAA}" type="datetimeFigureOut">
               <a:rPr lang="en-US" smtClean="0"/>
               <a:pPr/>
-              <a:t>2/4/2013</a:t>
+              <a:t>2/5/2013</a:t>
             </a:fld>
             <a:endParaRPr lang="en-US"/>
           </a:p>
@@ -2688,7 +2688,7 @@
             <a:fld id="{594F42AE-C09B-49E1-9668-264D417E4CAA}" type="datetimeFigureOut">
               <a:rPr lang="en-US" smtClean="0"/>
               <a:pPr/>
-              <a:t>2/4/2013</a:t>
+              <a:t>2/5/2013</a:t>
             </a:fld>
             <a:endParaRPr lang="en-US"/>
           </a:p>
@@ -3229,6 +3229,84 @@
           <a:ln>
             <a:noFill/>
           </a:ln>
+        </p:spPr>
+      </p:pic>
+      <p:pic>
+        <p:nvPicPr>
+          <p:cNvPr id="1026" name="Picture 2" descr="C:\Users\Vili\Desktop\FrodoPotterTheChosenOne\FrodoPotterTheChosenOne\FrodoPotterTheChosenOne-master\Game\Game\images\move right.png"/>
+          <p:cNvPicPr>
+            <a:picLocks noChangeAspect="1" noChangeArrowheads="1"/>
+          </p:cNvPicPr>
+          <p:nvPr/>
+        </p:nvPicPr>
+        <p:blipFill>
+          <a:blip r:embed="rId7" cstate="print"/>
+          <a:srcRect/>
+          <a:stretch>
+            <a:fillRect/>
+          </a:stretch>
+        </p:blipFill>
+        <p:spPr bwMode="auto">
+          <a:xfrm>
+            <a:off x="533400" y="533400"/>
+            <a:ext cx="2124075" cy="1219200"/>
+          </a:xfrm>
+          <a:prstGeom prst="rect">
+            <a:avLst/>
+          </a:prstGeom>
+          <a:noFill/>
+        </p:spPr>
+      </p:pic>
+      <p:pic>
+        <p:nvPicPr>
+          <p:cNvPr id="1027" name="Picture 3" descr="C:\Users\Vili\Desktop\FrodoPotterTheChosenOne\FrodoPotterTheChosenOne\FrodoPotterTheChosenOne-master\Game\Game\images\Move left.png"/>
+          <p:cNvPicPr>
+            <a:picLocks noChangeAspect="1" noChangeArrowheads="1"/>
+          </p:cNvPicPr>
+          <p:nvPr/>
+        </p:nvPicPr>
+        <p:blipFill>
+          <a:blip r:embed="rId8" cstate="print"/>
+          <a:srcRect/>
+          <a:stretch>
+            <a:fillRect/>
+          </a:stretch>
+        </p:blipFill>
+        <p:spPr bwMode="auto">
+          <a:xfrm>
+            <a:off x="609600" y="2286000"/>
+            <a:ext cx="2124075" cy="1219200"/>
+          </a:xfrm>
+          <a:prstGeom prst="rect">
+            <a:avLst/>
+          </a:prstGeom>
+          <a:noFill/>
+        </p:spPr>
+      </p:pic>
+      <p:pic>
+        <p:nvPicPr>
+          <p:cNvPr id="1028" name="Picture 4" descr="C:\Users\Vili\Desktop\FrodoPotterTheChosenOne\FrodoPotterTheChosenOne\FrodoPotterTheChosenOne-master\Game\Game\images\Move down.png"/>
+          <p:cNvPicPr>
+            <a:picLocks noChangeAspect="1" noChangeArrowheads="1"/>
+          </p:cNvPicPr>
+          <p:nvPr/>
+        </p:nvPicPr>
+        <p:blipFill>
+          <a:blip r:embed="rId9" cstate="print"/>
+          <a:srcRect/>
+          <a:stretch>
+            <a:fillRect/>
+          </a:stretch>
+        </p:blipFill>
+        <p:spPr bwMode="auto">
+          <a:xfrm>
+            <a:off x="5143500" y="4495800"/>
+            <a:ext cx="2124075" cy="1219200"/>
+          </a:xfrm>
+          <a:prstGeom prst="rect">
+            <a:avLst/>
+          </a:prstGeom>
+          <a:noFill/>
         </p:spPr>
       </p:pic>
     </p:spTree>

</xml_diff>